<commit_message>
New version of presentation
</commit_message>
<xml_diff>
--- a/presentation/NativeMobileApps_VeganFoodFinder.pptx
+++ b/presentation/NativeMobileApps_VeganFoodFinder.pptx
@@ -13,20 +13,21 @@
     <p:sldId id="258" r:id="rId8"/>
     <p:sldId id="259" r:id="rId9"/>
     <p:sldId id="260" r:id="rId10"/>
+    <p:sldId id="261" r:id="rId11"/>
   </p:sldIdLst>
   <p:sldSz cy="5143500" cx="9144000"/>
   <p:notesSz cx="6858000" cy="9144000"/>
   <p:embeddedFontLst>
     <p:embeddedFont>
       <p:font typeface="Proxima Nova"/>
-      <p:regular r:id="rId11"/>
-      <p:bold r:id="rId12"/>
-      <p:italic r:id="rId13"/>
-      <p:boldItalic r:id="rId14"/>
+      <p:regular r:id="rId12"/>
+      <p:bold r:id="rId13"/>
+      <p:italic r:id="rId14"/>
+      <p:boldItalic r:id="rId15"/>
     </p:embeddedFont>
     <p:embeddedFont>
       <p:font typeface="Alfa Slab One"/>
-      <p:regular r:id="rId15"/>
+      <p:regular r:id="rId16"/>
     </p:embeddedFont>
   </p:embeddedFontLst>
   <p:defaultTextStyle>
@@ -803,7 +804,7 @@
   <p:cSld>
     <p:spTree>
       <p:nvGrpSpPr>
-        <p:cNvPr id="59" name="Shape 59"/>
+        <p:cNvPr id="60" name="Shape 60"/>
         <p:cNvGrpSpPr/>
         <p:nvPr/>
       </p:nvGrpSpPr>
@@ -817,7 +818,7 @@
       </p:grpSpPr>
       <p:sp>
         <p:nvSpPr>
-          <p:cNvPr id="60" name="Shape 60"/>
+          <p:cNvPr id="61" name="Shape 61"/>
           <p:cNvSpPr/>
           <p:nvPr>
             <p:ph idx="2" type="sldImg"/>
@@ -851,7 +852,7 @@
       </p:sp>
       <p:sp>
         <p:nvSpPr>
-          <p:cNvPr id="61" name="Shape 61"/>
+          <p:cNvPr id="62" name="Shape 62"/>
           <p:cNvSpPr txBox="1"/>
           <p:nvPr>
             <p:ph idx="1" type="body"/>
@@ -901,7 +902,7 @@
   <p:cSld>
     <p:spTree>
       <p:nvGrpSpPr>
-        <p:cNvPr id="65" name="Shape 65"/>
+        <p:cNvPr id="70" name="Shape 70"/>
         <p:cNvGrpSpPr/>
         <p:nvPr/>
       </p:nvGrpSpPr>
@@ -915,7 +916,7 @@
       </p:grpSpPr>
       <p:sp>
         <p:nvSpPr>
-          <p:cNvPr id="66" name="Shape 66"/>
+          <p:cNvPr id="71" name="Shape 71"/>
           <p:cNvSpPr/>
           <p:nvPr>
             <p:ph idx="2" type="sldImg"/>
@@ -949,7 +950,7 @@
       </p:sp>
       <p:sp>
         <p:nvSpPr>
-          <p:cNvPr id="67" name="Shape 67"/>
+          <p:cNvPr id="72" name="Shape 72"/>
           <p:cNvSpPr txBox="1"/>
           <p:nvPr>
             <p:ph idx="1" type="body"/>
@@ -999,7 +1000,7 @@
   <p:cSld>
     <p:spTree>
       <p:nvGrpSpPr>
-        <p:cNvPr id="72" name="Shape 72"/>
+        <p:cNvPr id="76" name="Shape 76"/>
         <p:cNvGrpSpPr/>
         <p:nvPr/>
       </p:nvGrpSpPr>
@@ -1013,7 +1014,7 @@
       </p:grpSpPr>
       <p:sp>
         <p:nvSpPr>
-          <p:cNvPr id="73" name="Shape 73"/>
+          <p:cNvPr id="77" name="Shape 77"/>
           <p:cNvSpPr/>
           <p:nvPr>
             <p:ph idx="2" type="sldImg"/>
@@ -1047,7 +1048,7 @@
       </p:sp>
       <p:sp>
         <p:nvSpPr>
-          <p:cNvPr id="74" name="Shape 74"/>
+          <p:cNvPr id="78" name="Shape 78"/>
           <p:cNvSpPr txBox="1"/>
           <p:nvPr>
             <p:ph idx="1" type="body"/>
@@ -1097,7 +1098,7 @@
   <p:cSld>
     <p:spTree>
       <p:nvGrpSpPr>
-        <p:cNvPr id="80" name="Shape 80"/>
+        <p:cNvPr id="83" name="Shape 83"/>
         <p:cNvGrpSpPr/>
         <p:nvPr/>
       </p:nvGrpSpPr>
@@ -1111,7 +1112,7 @@
       </p:grpSpPr>
       <p:sp>
         <p:nvSpPr>
-          <p:cNvPr id="81" name="Shape 81"/>
+          <p:cNvPr id="84" name="Shape 84"/>
           <p:cNvSpPr/>
           <p:nvPr>
             <p:ph idx="2" type="sldImg"/>
@@ -1145,7 +1146,105 @@
       </p:sp>
       <p:sp>
         <p:nvSpPr>
-          <p:cNvPr id="82" name="Shape 82"/>
+          <p:cNvPr id="85" name="Shape 85"/>
+          <p:cNvSpPr txBox="1"/>
+          <p:nvPr>
+            <p:ph idx="1" type="body"/>
+          </p:nvPr>
+        </p:nvSpPr>
+        <p:spPr>
+          <a:xfrm>
+            <a:off x="685800" y="4343400"/>
+            <a:ext cx="5486400" cy="4114800"/>
+          </a:xfrm>
+          <a:prstGeom prst="rect">
+            <a:avLst/>
+          </a:prstGeom>
+        </p:spPr>
+        <p:txBody>
+          <a:bodyPr anchorCtr="0" anchor="t" bIns="91425" lIns="91425" spcFirstLastPara="1" rIns="91425" wrap="square" tIns="91425">
+            <a:noAutofit/>
+          </a:bodyPr>
+          <a:lstStyle/>
+          <a:p>
+            <a:pPr indent="0" lvl="0" marL="0" rtl="0">
+              <a:spcBef>
+                <a:spcPts val="0"/>
+              </a:spcBef>
+              <a:spcAft>
+                <a:spcPts val="0"/>
+              </a:spcAft>
+              <a:buNone/>
+            </a:pPr>
+            <a:r>
+              <a:t/>
+            </a:r>
+            <a:endParaRPr/>
+          </a:p>
+        </p:txBody>
+      </p:sp>
+    </p:spTree>
+  </p:cSld>
+  <p:clrMapOvr>
+    <a:masterClrMapping/>
+  </p:clrMapOvr>
+</p:notes>
+</file>
+
+<file path=ppt/notesSlides/notesSlide6.xml><?xml version="1.0" encoding="utf-8"?>
+<p:notes xmlns:a="http://schemas.openxmlformats.org/drawingml/2006/main" xmlns:r="http://schemas.openxmlformats.org/officeDocument/2006/relationships" xmlns:mc="http://schemas.openxmlformats.org/markup-compatibility/2006" xmlns:mv="urn:schemas-microsoft-com:mac:vml" xmlns:p="http://schemas.openxmlformats.org/presentationml/2006/main" xmlns:c="http://schemas.openxmlformats.org/drawingml/2006/chart" xmlns:dgm="http://schemas.openxmlformats.org/drawingml/2006/diagram" xmlns:o="urn:schemas-microsoft-com:office:office" xmlns:v="urn:schemas-microsoft-com:vml" xmlns:pvml="urn:schemas-microsoft-com:office:powerpoint" xmlns:com="http://schemas.openxmlformats.org/drawingml/2006/compatibility" xmlns:p14="http://schemas.microsoft.com/office/powerpoint/2010/main" xmlns:p15="http://schemas.microsoft.com/office/powerpoint/2012/main" showMasterPhAnim="0" showMasterSp="0">
+  <p:cSld>
+    <p:spTree>
+      <p:nvGrpSpPr>
+        <p:cNvPr id="94" name="Shape 94"/>
+        <p:cNvGrpSpPr/>
+        <p:nvPr/>
+      </p:nvGrpSpPr>
+      <p:grpSpPr>
+        <a:xfrm>
+          <a:off x="0" y="0"/>
+          <a:ext cx="0" cy="0"/>
+          <a:chOff x="0" y="0"/>
+          <a:chExt cx="0" cy="0"/>
+        </a:xfrm>
+      </p:grpSpPr>
+      <p:sp>
+        <p:nvSpPr>
+          <p:cNvPr id="95" name="Shape 95"/>
+          <p:cNvSpPr/>
+          <p:nvPr>
+            <p:ph idx="2" type="sldImg"/>
+          </p:nvPr>
+        </p:nvSpPr>
+        <p:spPr>
+          <a:xfrm>
+            <a:off x="381300" y="685800"/>
+            <a:ext cx="6096000" cy="3429000"/>
+          </a:xfrm>
+          <a:custGeom>
+            <a:pathLst>
+              <a:path extrusionOk="0" h="120000" w="120000">
+                <a:moveTo>
+                  <a:pt x="0" y="0"/>
+                </a:moveTo>
+                <a:lnTo>
+                  <a:pt x="120000" y="0"/>
+                </a:lnTo>
+                <a:lnTo>
+                  <a:pt x="120000" y="120000"/>
+                </a:lnTo>
+                <a:lnTo>
+                  <a:pt x="0" y="120000"/>
+                </a:lnTo>
+                <a:close/>
+              </a:path>
+            </a:pathLst>
+          </a:custGeom>
+        </p:spPr>
+      </p:sp>
+      <p:sp>
+        <p:nvSpPr>
+          <p:cNvPr id="96" name="Shape 96"/>
           <p:cNvSpPr txBox="1"/>
           <p:nvPr>
             <p:ph idx="1" type="body"/>
@@ -6366,6 +6465,13 @@
 <file path=ppt/slides/slide1.xml><?xml version="1.0" encoding="utf-8"?>
 <p:sld xmlns:a="http://schemas.openxmlformats.org/drawingml/2006/main" xmlns:r="http://schemas.openxmlformats.org/officeDocument/2006/relationships" xmlns:mc="http://schemas.openxmlformats.org/markup-compatibility/2006" xmlns:mv="urn:schemas-microsoft-com:mac:vml" xmlns:p="http://schemas.openxmlformats.org/presentationml/2006/main" xmlns:c="http://schemas.openxmlformats.org/drawingml/2006/chart" xmlns:dgm="http://schemas.openxmlformats.org/drawingml/2006/diagram" xmlns:o="urn:schemas-microsoft-com:office:office" xmlns:v="urn:schemas-microsoft-com:vml" xmlns:pvml="urn:schemas-microsoft-com:office:powerpoint" xmlns:com="http://schemas.openxmlformats.org/drawingml/2006/compatibility" xmlns:p14="http://schemas.microsoft.com/office/powerpoint/2010/main" xmlns:p15="http://schemas.microsoft.com/office/powerpoint/2012/main">
   <p:cSld>
+    <p:bg>
+      <p:bgPr>
+        <a:solidFill>
+          <a:srgbClr val="FFFFFF"/>
+        </a:solidFill>
+      </p:bgPr>
+    </p:bg>
     <p:spTree>
       <p:nvGrpSpPr>
         <p:cNvPr id="55" name="Shape 55"/>
@@ -6380,49 +6486,9 @@
           <a:chExt cx="0" cy="0"/>
         </a:xfrm>
       </p:grpSpPr>
-      <p:sp>
-        <p:nvSpPr>
-          <p:cNvPr id="56" name="Shape 56"/>
-          <p:cNvSpPr txBox="1"/>
-          <p:nvPr>
-            <p:ph idx="1" type="subTitle"/>
-          </p:nvPr>
-        </p:nvSpPr>
-        <p:spPr>
-          <a:xfrm>
-            <a:off x="311700" y="3094423"/>
-            <a:ext cx="8520600" cy="733500"/>
-          </a:xfrm>
-          <a:prstGeom prst="rect">
-            <a:avLst/>
-          </a:prstGeom>
-        </p:spPr>
-        <p:txBody>
-          <a:bodyPr anchorCtr="0" anchor="t" bIns="91425" lIns="91425" spcFirstLastPara="1" rIns="91425" wrap="square" tIns="91425">
-            <a:noAutofit/>
-          </a:bodyPr>
-          <a:lstStyle/>
-          <a:p>
-            <a:pPr indent="0" lvl="0" marL="0">
-              <a:spcBef>
-                <a:spcPts val="0"/>
-              </a:spcBef>
-              <a:spcAft>
-                <a:spcPts val="0"/>
-              </a:spcAft>
-              <a:buNone/>
-            </a:pPr>
-            <a:r>
-              <a:rPr lang="nl" sz="4000"/>
-              <a:t>Vegan food finder</a:t>
-            </a:r>
-            <a:endParaRPr sz="4000"/>
-          </a:p>
-        </p:txBody>
-      </p:sp>
       <p:pic>
         <p:nvPicPr>
-          <p:cNvPr id="57" name="Shape 57"/>
+          <p:cNvPr id="56" name="Shape 56"/>
           <p:cNvPicPr preferRelativeResize="0"/>
           <p:nvPr/>
         </p:nvPicPr>
@@ -6436,8 +6502,8 @@
         </p:blipFill>
         <p:spPr>
           <a:xfrm>
-            <a:off x="3287313" y="525063"/>
-            <a:ext cx="2569375" cy="2569375"/>
+            <a:off x="-12" y="3143016"/>
+            <a:ext cx="9144000" cy="2000245"/>
           </a:xfrm>
           <a:prstGeom prst="rect">
             <a:avLst/>
@@ -6450,28 +6516,38 @@
       </p:pic>
       <p:sp>
         <p:nvSpPr>
-          <p:cNvPr id="58" name="Shape 58"/>
-          <p:cNvSpPr txBox="1"/>
-          <p:nvPr>
-            <p:ph idx="1" type="subTitle"/>
-          </p:nvPr>
+          <p:cNvPr id="57" name="Shape 57"/>
+          <p:cNvSpPr/>
+          <p:nvPr/>
         </p:nvSpPr>
         <p:spPr>
           <a:xfrm>
-            <a:off x="311700" y="4175423"/>
-            <a:ext cx="8520600" cy="733500"/>
+            <a:off x="4238250" y="2539100"/>
+            <a:ext cx="667500" cy="369900"/>
           </a:xfrm>
           <a:prstGeom prst="rect">
             <a:avLst/>
           </a:prstGeom>
+          <a:solidFill>
+            <a:srgbClr val="FFFFFF"/>
+          </a:solidFill>
+          <a:ln cap="flat" cmpd="sng" w="9525">
+            <a:solidFill>
+              <a:schemeClr val="lt1"/>
+            </a:solidFill>
+            <a:prstDash val="solid"/>
+            <a:round/>
+            <a:headEnd len="sm" w="sm" type="none"/>
+            <a:tailEnd len="sm" w="sm" type="none"/>
+          </a:ln>
         </p:spPr>
         <p:txBody>
-          <a:bodyPr anchorCtr="0" anchor="t" bIns="91425" lIns="91425" spcFirstLastPara="1" rIns="91425" wrap="square" tIns="91425">
+          <a:bodyPr anchorCtr="0" anchor="ctr" bIns="91425" lIns="91425" spcFirstLastPara="1" rIns="91425" wrap="square" tIns="91425">
             <a:noAutofit/>
           </a:bodyPr>
           <a:lstStyle/>
           <a:p>
-            <a:pPr indent="0" lvl="0" marL="0" rtl="0" algn="l">
+            <a:pPr indent="0" lvl="0" marL="0">
               <a:spcBef>
                 <a:spcPts val="0"/>
               </a:spcBef>
@@ -6481,24 +6557,68 @@
               <a:buNone/>
             </a:pPr>
             <a:r>
-              <a:rPr lang="nl" sz="2000"/>
-              <a:t>Group: </a:t>
+              <a:t/>
             </a:r>
-            <a:r>
-              <a:rPr b="1" lang="nl" sz="2000"/>
-              <a:t>TabTab Studio</a:t>
-            </a:r>
-            <a:br>
-              <a:rPr lang="nl" sz="2000"/>
-            </a:br>
-            <a:r>
-              <a:rPr lang="nl" sz="2000"/>
-              <a:t>Group members: Thomas Billiet, Jonas Anseel, Hayk Avetisyan</a:t>
-            </a:r>
-            <a:endParaRPr sz="2000"/>
+            <a:endParaRPr/>
           </a:p>
         </p:txBody>
       </p:sp>
+      <p:pic>
+        <p:nvPicPr>
+          <p:cNvPr id="58" name="Shape 58"/>
+          <p:cNvPicPr preferRelativeResize="0"/>
+          <p:nvPr/>
+        </p:nvPicPr>
+        <p:blipFill>
+          <a:blip r:embed="rId4">
+            <a:alphaModFix/>
+          </a:blip>
+          <a:stretch>
+            <a:fillRect/>
+          </a:stretch>
+        </p:blipFill>
+        <p:spPr>
+          <a:xfrm>
+            <a:off x="3168662" y="390412"/>
+            <a:ext cx="2806674" cy="2696864"/>
+          </a:xfrm>
+          <a:prstGeom prst="rect">
+            <a:avLst/>
+          </a:prstGeom>
+          <a:noFill/>
+          <a:ln>
+            <a:noFill/>
+          </a:ln>
+        </p:spPr>
+      </p:pic>
+      <p:pic>
+        <p:nvPicPr>
+          <p:cNvPr id="59" name="Shape 59"/>
+          <p:cNvPicPr preferRelativeResize="0"/>
+          <p:nvPr/>
+        </p:nvPicPr>
+        <p:blipFill>
+          <a:blip r:embed="rId5">
+            <a:alphaModFix/>
+          </a:blip>
+          <a:stretch>
+            <a:fillRect/>
+          </a:stretch>
+        </p:blipFill>
+        <p:spPr>
+          <a:xfrm>
+            <a:off x="6523448" y="198445"/>
+            <a:ext cx="2458226" cy="1454025"/>
+          </a:xfrm>
+          <a:prstGeom prst="rect">
+            <a:avLst/>
+          </a:prstGeom>
+          <a:noFill/>
+          <a:ln>
+            <a:noFill/>
+          </a:ln>
+        </p:spPr>
+      </p:pic>
     </p:spTree>
   </p:cSld>
   <p:clrMapOvr>
@@ -6512,7 +6632,398 @@
   <p:cSld>
     <p:spTree>
       <p:nvGrpSpPr>
-        <p:cNvPr id="62" name="Shape 62"/>
+        <p:cNvPr id="63" name="Shape 63"/>
+        <p:cNvGrpSpPr/>
+        <p:nvPr/>
+      </p:nvGrpSpPr>
+      <p:grpSpPr>
+        <a:xfrm>
+          <a:off x="0" y="0"/>
+          <a:ext cx="0" cy="0"/>
+          <a:chOff x="0" y="0"/>
+          <a:chExt cx="0" cy="0"/>
+        </a:xfrm>
+      </p:grpSpPr>
+      <p:pic>
+        <p:nvPicPr>
+          <p:cNvPr id="64" name="Shape 64"/>
+          <p:cNvPicPr preferRelativeResize="0"/>
+          <p:nvPr/>
+        </p:nvPicPr>
+        <p:blipFill>
+          <a:blip r:embed="rId3">
+            <a:alphaModFix/>
+          </a:blip>
+          <a:stretch>
+            <a:fillRect/>
+          </a:stretch>
+        </p:blipFill>
+        <p:spPr>
+          <a:xfrm>
+            <a:off x="483175" y="562875"/>
+            <a:ext cx="1924050" cy="3286125"/>
+          </a:xfrm>
+          <a:prstGeom prst="rect">
+            <a:avLst/>
+          </a:prstGeom>
+          <a:noFill/>
+          <a:ln>
+            <a:noFill/>
+          </a:ln>
+        </p:spPr>
+      </p:pic>
+      <p:pic>
+        <p:nvPicPr>
+          <p:cNvPr id="65" name="Shape 65"/>
+          <p:cNvPicPr preferRelativeResize="0"/>
+          <p:nvPr/>
+        </p:nvPicPr>
+        <p:blipFill>
+          <a:blip r:embed="rId4">
+            <a:alphaModFix/>
+          </a:blip>
+          <a:stretch>
+            <a:fillRect/>
+          </a:stretch>
+        </p:blipFill>
+        <p:spPr>
+          <a:xfrm>
+            <a:off x="3200400" y="1686825"/>
+            <a:ext cx="2438400" cy="2162175"/>
+          </a:xfrm>
+          <a:prstGeom prst="rect">
+            <a:avLst/>
+          </a:prstGeom>
+          <a:noFill/>
+          <a:ln>
+            <a:noFill/>
+          </a:ln>
+        </p:spPr>
+      </p:pic>
+      <p:pic>
+        <p:nvPicPr>
+          <p:cNvPr id="66" name="Shape 66"/>
+          <p:cNvPicPr preferRelativeResize="0"/>
+          <p:nvPr/>
+        </p:nvPicPr>
+        <p:blipFill>
+          <a:blip r:embed="rId5">
+            <a:alphaModFix/>
+          </a:blip>
+          <a:stretch>
+            <a:fillRect/>
+          </a:stretch>
+        </p:blipFill>
+        <p:spPr>
+          <a:xfrm>
+            <a:off x="6603450" y="1753400"/>
+            <a:ext cx="2190750" cy="2190750"/>
+          </a:xfrm>
+          <a:prstGeom prst="rect">
+            <a:avLst/>
+          </a:prstGeom>
+          <a:noFill/>
+          <a:ln>
+            <a:noFill/>
+          </a:ln>
+        </p:spPr>
+      </p:pic>
+      <p:sp>
+        <p:nvSpPr>
+          <p:cNvPr id="67" name="Shape 67"/>
+          <p:cNvSpPr txBox="1"/>
+          <p:nvPr>
+            <p:ph idx="4294967295" type="subTitle"/>
+          </p:nvPr>
+        </p:nvSpPr>
+        <p:spPr>
+          <a:xfrm>
+            <a:off x="210688" y="4088525"/>
+            <a:ext cx="2469000" cy="733500"/>
+          </a:xfrm>
+          <a:prstGeom prst="rect">
+            <a:avLst/>
+          </a:prstGeom>
+        </p:spPr>
+        <p:txBody>
+          <a:bodyPr anchorCtr="0" anchor="t" bIns="91425" lIns="91425" spcFirstLastPara="1" rIns="91425" wrap="square" tIns="91425">
+            <a:noAutofit/>
+          </a:bodyPr>
+          <a:lstStyle/>
+          <a:p>
+            <a:pPr indent="0" lvl="0" marL="0" rtl="0" algn="ctr">
+              <a:lnSpc>
+                <a:spcPct val="100000"/>
+              </a:lnSpc>
+              <a:spcBef>
+                <a:spcPts val="0"/>
+              </a:spcBef>
+              <a:spcAft>
+                <a:spcPts val="0"/>
+              </a:spcAft>
+              <a:buNone/>
+            </a:pPr>
+            <a:r>
+              <a:rPr b="1" lang="nl" sz="1600">
+                <a:solidFill>
+                  <a:srgbClr val="000000"/>
+                </a:solidFill>
+                <a:latin typeface="Arial"/>
+                <a:ea typeface="Arial"/>
+                <a:cs typeface="Arial"/>
+                <a:sym typeface="Arial"/>
+              </a:rPr>
+              <a:t>Thomas Billiet</a:t>
+            </a:r>
+            <a:endParaRPr b="1" sz="1600">
+              <a:solidFill>
+                <a:srgbClr val="000000"/>
+              </a:solidFill>
+              <a:latin typeface="Arial"/>
+              <a:ea typeface="Arial"/>
+              <a:cs typeface="Arial"/>
+              <a:sym typeface="Arial"/>
+            </a:endParaRPr>
+          </a:p>
+          <a:p>
+            <a:pPr indent="0" lvl="0" marL="0" rtl="0" algn="ctr">
+              <a:lnSpc>
+                <a:spcPct val="100000"/>
+              </a:lnSpc>
+              <a:spcBef>
+                <a:spcPts val="400"/>
+              </a:spcBef>
+              <a:spcAft>
+                <a:spcPts val="400"/>
+              </a:spcAft>
+              <a:buNone/>
+            </a:pPr>
+            <a:r>
+              <a:rPr lang="nl" sz="1400">
+                <a:solidFill>
+                  <a:srgbClr val="000000"/>
+                </a:solidFill>
+                <a:latin typeface="Arial"/>
+                <a:ea typeface="Arial"/>
+                <a:cs typeface="Arial"/>
+                <a:sym typeface="Arial"/>
+              </a:rPr>
+              <a:t>Software Analyst/Architect</a:t>
+            </a:r>
+            <a:endParaRPr sz="1400">
+              <a:solidFill>
+                <a:srgbClr val="000000"/>
+              </a:solidFill>
+              <a:latin typeface="Arial"/>
+              <a:ea typeface="Arial"/>
+              <a:cs typeface="Arial"/>
+              <a:sym typeface="Arial"/>
+            </a:endParaRPr>
+          </a:p>
+        </p:txBody>
+      </p:sp>
+      <p:sp>
+        <p:nvSpPr>
+          <p:cNvPr id="68" name="Shape 68"/>
+          <p:cNvSpPr txBox="1"/>
+          <p:nvPr>
+            <p:ph idx="4294967295" type="subTitle"/>
+          </p:nvPr>
+        </p:nvSpPr>
+        <p:spPr>
+          <a:xfrm>
+            <a:off x="3337500" y="4088525"/>
+            <a:ext cx="2469000" cy="733500"/>
+          </a:xfrm>
+          <a:prstGeom prst="rect">
+            <a:avLst/>
+          </a:prstGeom>
+        </p:spPr>
+        <p:txBody>
+          <a:bodyPr anchorCtr="0" anchor="t" bIns="91425" lIns="91425" spcFirstLastPara="1" rIns="91425" wrap="square" tIns="91425">
+            <a:noAutofit/>
+          </a:bodyPr>
+          <a:lstStyle/>
+          <a:p>
+            <a:pPr indent="0" lvl="0" marL="0" rtl="0" algn="ctr">
+              <a:lnSpc>
+                <a:spcPct val="100000"/>
+              </a:lnSpc>
+              <a:spcBef>
+                <a:spcPts val="0"/>
+              </a:spcBef>
+              <a:spcAft>
+                <a:spcPts val="0"/>
+              </a:spcAft>
+              <a:buNone/>
+            </a:pPr>
+            <a:r>
+              <a:rPr b="1" lang="nl" sz="1600">
+                <a:solidFill>
+                  <a:srgbClr val="000000"/>
+                </a:solidFill>
+                <a:latin typeface="Arial"/>
+                <a:ea typeface="Arial"/>
+                <a:cs typeface="Arial"/>
+                <a:sym typeface="Arial"/>
+              </a:rPr>
+              <a:t>Jonas Anseel</a:t>
+            </a:r>
+            <a:endParaRPr b="1" sz="1600">
+              <a:solidFill>
+                <a:srgbClr val="000000"/>
+              </a:solidFill>
+              <a:latin typeface="Arial"/>
+              <a:ea typeface="Arial"/>
+              <a:cs typeface="Arial"/>
+              <a:sym typeface="Arial"/>
+            </a:endParaRPr>
+          </a:p>
+          <a:p>
+            <a:pPr indent="0" lvl="0" marL="0" rtl="0" algn="ctr">
+              <a:lnSpc>
+                <a:spcPct val="100000"/>
+              </a:lnSpc>
+              <a:spcBef>
+                <a:spcPts val="400"/>
+              </a:spcBef>
+              <a:spcAft>
+                <a:spcPts val="400"/>
+              </a:spcAft>
+              <a:buNone/>
+            </a:pPr>
+            <a:r>
+              <a:rPr lang="nl" sz="1400">
+                <a:solidFill>
+                  <a:srgbClr val="000000"/>
+                </a:solidFill>
+                <a:latin typeface="Arial"/>
+                <a:ea typeface="Arial"/>
+                <a:cs typeface="Arial"/>
+                <a:sym typeface="Arial"/>
+              </a:rPr>
+              <a:t>Software Engineer</a:t>
+            </a:r>
+            <a:endParaRPr sz="1400">
+              <a:solidFill>
+                <a:srgbClr val="000000"/>
+              </a:solidFill>
+              <a:latin typeface="Arial"/>
+              <a:ea typeface="Arial"/>
+              <a:cs typeface="Arial"/>
+              <a:sym typeface="Arial"/>
+            </a:endParaRPr>
+          </a:p>
+        </p:txBody>
+      </p:sp>
+      <p:sp>
+        <p:nvSpPr>
+          <p:cNvPr id="69" name="Shape 69"/>
+          <p:cNvSpPr txBox="1"/>
+          <p:nvPr>
+            <p:ph idx="4294967295" type="subTitle"/>
+          </p:nvPr>
+        </p:nvSpPr>
+        <p:spPr>
+          <a:xfrm>
+            <a:off x="6464313" y="4088525"/>
+            <a:ext cx="2469000" cy="733500"/>
+          </a:xfrm>
+          <a:prstGeom prst="rect">
+            <a:avLst/>
+          </a:prstGeom>
+        </p:spPr>
+        <p:txBody>
+          <a:bodyPr anchorCtr="0" anchor="t" bIns="91425" lIns="91425" spcFirstLastPara="1" rIns="91425" wrap="square" tIns="91425">
+            <a:noAutofit/>
+          </a:bodyPr>
+          <a:lstStyle/>
+          <a:p>
+            <a:pPr indent="0" lvl="0" marL="0" rtl="0" algn="ctr">
+              <a:lnSpc>
+                <a:spcPct val="100000"/>
+              </a:lnSpc>
+              <a:spcBef>
+                <a:spcPts val="0"/>
+              </a:spcBef>
+              <a:spcAft>
+                <a:spcPts val="0"/>
+              </a:spcAft>
+              <a:buNone/>
+            </a:pPr>
+            <a:r>
+              <a:rPr b="1" lang="nl" sz="1600">
+                <a:solidFill>
+                  <a:srgbClr val="000000"/>
+                </a:solidFill>
+                <a:latin typeface="Arial"/>
+                <a:ea typeface="Arial"/>
+                <a:cs typeface="Arial"/>
+                <a:sym typeface="Arial"/>
+              </a:rPr>
+              <a:t>Hayk Avetisyan</a:t>
+            </a:r>
+            <a:endParaRPr b="1" sz="1600">
+              <a:solidFill>
+                <a:srgbClr val="000000"/>
+              </a:solidFill>
+              <a:latin typeface="Arial"/>
+              <a:ea typeface="Arial"/>
+              <a:cs typeface="Arial"/>
+              <a:sym typeface="Arial"/>
+            </a:endParaRPr>
+          </a:p>
+          <a:p>
+            <a:pPr indent="0" lvl="0" marL="0" rtl="0" algn="ctr">
+              <a:lnSpc>
+                <a:spcPct val="100000"/>
+              </a:lnSpc>
+              <a:spcBef>
+                <a:spcPts val="400"/>
+              </a:spcBef>
+              <a:spcAft>
+                <a:spcPts val="400"/>
+              </a:spcAft>
+              <a:buNone/>
+            </a:pPr>
+            <a:r>
+              <a:rPr lang="nl" sz="1400">
+                <a:solidFill>
+                  <a:srgbClr val="000000"/>
+                </a:solidFill>
+                <a:latin typeface="Arial"/>
+                <a:ea typeface="Arial"/>
+                <a:cs typeface="Arial"/>
+                <a:sym typeface="Arial"/>
+              </a:rPr>
+              <a:t>Software Bug Tester</a:t>
+            </a:r>
+            <a:endParaRPr sz="1400">
+              <a:solidFill>
+                <a:srgbClr val="000000"/>
+              </a:solidFill>
+              <a:latin typeface="Arial"/>
+              <a:ea typeface="Arial"/>
+              <a:cs typeface="Arial"/>
+              <a:sym typeface="Arial"/>
+            </a:endParaRPr>
+          </a:p>
+        </p:txBody>
+      </p:sp>
+    </p:spTree>
+  </p:cSld>
+  <p:clrMapOvr>
+    <a:masterClrMapping/>
+  </p:clrMapOvr>
+</p:sld>
+</file>
+
+<file path=ppt/slides/slide3.xml><?xml version="1.0" encoding="utf-8"?>
+<p:sld xmlns:a="http://schemas.openxmlformats.org/drawingml/2006/main" xmlns:r="http://schemas.openxmlformats.org/officeDocument/2006/relationships" xmlns:mc="http://schemas.openxmlformats.org/markup-compatibility/2006" xmlns:mv="urn:schemas-microsoft-com:mac:vml" xmlns:p="http://schemas.openxmlformats.org/presentationml/2006/main" xmlns:c="http://schemas.openxmlformats.org/drawingml/2006/chart" xmlns:dgm="http://schemas.openxmlformats.org/drawingml/2006/diagram" xmlns:o="urn:schemas-microsoft-com:office:office" xmlns:v="urn:schemas-microsoft-com:vml" xmlns:pvml="urn:schemas-microsoft-com:office:powerpoint" xmlns:com="http://schemas.openxmlformats.org/drawingml/2006/compatibility" xmlns:p14="http://schemas.microsoft.com/office/powerpoint/2010/main" xmlns:p15="http://schemas.microsoft.com/office/powerpoint/2012/main">
+  <p:cSld>
+    <p:spTree>
+      <p:nvGrpSpPr>
+        <p:cNvPr id="73" name="Shape 73"/>
         <p:cNvGrpSpPr/>
         <p:nvPr/>
       </p:nvGrpSpPr>
@@ -6526,7 +7037,7 @@
       </p:grpSpPr>
       <p:sp>
         <p:nvSpPr>
-          <p:cNvPr id="63" name="Shape 63"/>
+          <p:cNvPr id="74" name="Shape 74"/>
           <p:cNvSpPr txBox="1"/>
           <p:nvPr>
             <p:ph type="title"/>
@@ -6566,7 +7077,7 @@
       </p:sp>
       <p:sp>
         <p:nvSpPr>
-          <p:cNvPr id="64" name="Shape 64"/>
+          <p:cNvPr id="75" name="Shape 75"/>
           <p:cNvSpPr txBox="1"/>
           <p:nvPr>
             <p:ph idx="1" type="body"/>
@@ -6655,12 +7166,12 @@
 </p:sld>
 </file>
 
-<file path=ppt/slides/slide3.xml><?xml version="1.0" encoding="utf-8"?>
+<file path=ppt/slides/slide4.xml><?xml version="1.0" encoding="utf-8"?>
 <p:sld xmlns:a="http://schemas.openxmlformats.org/drawingml/2006/main" xmlns:r="http://schemas.openxmlformats.org/officeDocument/2006/relationships" xmlns:mc="http://schemas.openxmlformats.org/markup-compatibility/2006" xmlns:mv="urn:schemas-microsoft-com:mac:vml" xmlns:p="http://schemas.openxmlformats.org/presentationml/2006/main" xmlns:c="http://schemas.openxmlformats.org/drawingml/2006/chart" xmlns:dgm="http://schemas.openxmlformats.org/drawingml/2006/diagram" xmlns:o="urn:schemas-microsoft-com:office:office" xmlns:v="urn:schemas-microsoft-com:vml" xmlns:pvml="urn:schemas-microsoft-com:office:powerpoint" xmlns:com="http://schemas.openxmlformats.org/drawingml/2006/compatibility" xmlns:p14="http://schemas.microsoft.com/office/powerpoint/2010/main" xmlns:p15="http://schemas.microsoft.com/office/powerpoint/2012/main">
   <p:cSld>
     <p:spTree>
       <p:nvGrpSpPr>
-        <p:cNvPr id="68" name="Shape 68"/>
+        <p:cNvPr id="79" name="Shape 79"/>
         <p:cNvGrpSpPr/>
         <p:nvPr/>
       </p:nvGrpSpPr>
@@ -6674,7 +7185,7 @@
       </p:grpSpPr>
       <p:sp>
         <p:nvSpPr>
-          <p:cNvPr id="69" name="Shape 69"/>
+          <p:cNvPr id="80" name="Shape 80"/>
           <p:cNvSpPr txBox="1"/>
           <p:nvPr>
             <p:ph type="title"/>
@@ -6714,7 +7225,7 @@
       </p:sp>
       <p:sp>
         <p:nvSpPr>
-          <p:cNvPr id="70" name="Shape 70"/>
+          <p:cNvPr id="81" name="Shape 81"/>
           <p:cNvSpPr txBox="1"/>
           <p:nvPr>
             <p:ph idx="1" type="body"/>
@@ -6768,7 +7279,7 @@
       </p:sp>
       <p:pic>
         <p:nvPicPr>
-          <p:cNvPr id="71" name="Shape 71"/>
+          <p:cNvPr id="82" name="Shape 82"/>
           <p:cNvPicPr preferRelativeResize="0"/>
           <p:nvPr/>
         </p:nvPicPr>
@@ -6802,12 +7313,12 @@
 </p:sld>
 </file>
 
-<file path=ppt/slides/slide4.xml><?xml version="1.0" encoding="utf-8"?>
+<file path=ppt/slides/slide5.xml><?xml version="1.0" encoding="utf-8"?>
 <p:sld xmlns:a="http://schemas.openxmlformats.org/drawingml/2006/main" xmlns:r="http://schemas.openxmlformats.org/officeDocument/2006/relationships" xmlns:mc="http://schemas.openxmlformats.org/markup-compatibility/2006" xmlns:mv="urn:schemas-microsoft-com:mac:vml" xmlns:p="http://schemas.openxmlformats.org/presentationml/2006/main" xmlns:c="http://schemas.openxmlformats.org/drawingml/2006/chart" xmlns:dgm="http://schemas.openxmlformats.org/drawingml/2006/diagram" xmlns:o="urn:schemas-microsoft-com:office:office" xmlns:v="urn:schemas-microsoft-com:vml" xmlns:pvml="urn:schemas-microsoft-com:office:powerpoint" xmlns:com="http://schemas.openxmlformats.org/drawingml/2006/compatibility" xmlns:p14="http://schemas.microsoft.com/office/powerpoint/2010/main" xmlns:p15="http://schemas.microsoft.com/office/powerpoint/2012/main">
   <p:cSld>
     <p:spTree>
       <p:nvGrpSpPr>
-        <p:cNvPr id="75" name="Shape 75"/>
+        <p:cNvPr id="86" name="Shape 86"/>
         <p:cNvGrpSpPr/>
         <p:nvPr/>
       </p:nvGrpSpPr>
@@ -6821,7 +7332,7 @@
       </p:grpSpPr>
       <p:sp>
         <p:nvSpPr>
-          <p:cNvPr id="76" name="Shape 76"/>
+          <p:cNvPr id="87" name="Shape 87"/>
           <p:cNvSpPr txBox="1"/>
           <p:nvPr>
             <p:ph type="title"/>
@@ -6842,7 +7353,7 @@
           </a:bodyPr>
           <a:lstStyle/>
           <a:p>
-            <a:pPr indent="0" lvl="0" marL="0">
+            <a:pPr indent="0" lvl="0" marL="0" rtl="0">
               <a:spcBef>
                 <a:spcPts val="0"/>
               </a:spcBef>
@@ -6876,7 +7387,7 @@
       </p:sp>
       <p:sp>
         <p:nvSpPr>
-          <p:cNvPr id="77" name="Shape 77"/>
+          <p:cNvPr id="88" name="Shape 88"/>
           <p:cNvSpPr txBox="1"/>
           <p:nvPr>
             <p:ph idx="1" type="body"/>
@@ -6897,7 +7408,7 @@
           </a:bodyPr>
           <a:lstStyle/>
           <a:p>
-            <a:pPr indent="0" lvl="0" marL="0">
+            <a:pPr indent="0" lvl="0" marL="0" rtl="0" algn="ctr">
               <a:spcBef>
                 <a:spcPts val="0"/>
               </a:spcBef>
@@ -6913,50 +7424,17 @@
             <a:endParaRPr/>
           </a:p>
           <a:p>
-            <a:pPr indent="0" lvl="0" marL="0">
+            <a:pPr indent="0" lvl="0" marL="0" rtl="0">
               <a:spcBef>
                 <a:spcPts val="1600"/>
               </a:spcBef>
               <a:spcAft>
-                <a:spcPts val="0"/>
+                <a:spcPts val="1600"/>
               </a:spcAft>
               <a:buNone/>
             </a:pPr>
             <a:r>
-              <a:rPr lang="nl"/>
-              <a:t>-&gt; Give label suggestions</a:t>
-            </a:r>
-            <a:endParaRPr/>
-          </a:p>
-          <a:p>
-            <a:pPr indent="0" lvl="0" marL="0">
-              <a:spcBef>
-                <a:spcPts val="1600"/>
-              </a:spcBef>
-              <a:spcAft>
-                <a:spcPts val="0"/>
-              </a:spcAft>
-              <a:buNone/>
-            </a:pPr>
-            <a:r>
-              <a:rPr lang="nl"/>
-              <a:t>-&gt; Give brand suggestions</a:t>
-            </a:r>
-            <a:endParaRPr/>
-          </a:p>
-          <a:p>
-            <a:pPr indent="0" lvl="0" marL="0">
-              <a:spcBef>
-                <a:spcPts val="1600"/>
-              </a:spcBef>
-              <a:spcAft>
-                <a:spcPts val="1600"/>
-              </a:spcAft>
-              <a:buNone/>
-            </a:pPr>
-            <a:r>
-              <a:rPr lang="nl"/>
-              <a:t>-&gt; Safe Search</a:t>
+              <a:t/>
             </a:r>
             <a:endParaRPr/>
           </a:p>
@@ -6964,7 +7442,7 @@
       </p:sp>
       <p:pic>
         <p:nvPicPr>
-          <p:cNvPr id="78" name="Shape 78"/>
+          <p:cNvPr id="89" name="Shape 89"/>
           <p:cNvPicPr preferRelativeResize="0"/>
           <p:nvPr/>
         </p:nvPicPr>
@@ -6978,8 +7456,8 @@
         </p:blipFill>
         <p:spPr>
           <a:xfrm>
-            <a:off x="3312975" y="3446225"/>
-            <a:ext cx="4884475" cy="1122750"/>
+            <a:off x="4271610" y="3821837"/>
+            <a:ext cx="4386566" cy="1008300"/>
           </a:xfrm>
           <a:prstGeom prst="rect">
             <a:avLst/>
@@ -6992,7 +7470,7 @@
       </p:pic>
       <p:pic>
         <p:nvPicPr>
-          <p:cNvPr id="79" name="Shape 79"/>
+          <p:cNvPr id="90" name="Shape 90"/>
           <p:cNvPicPr preferRelativeResize="0"/>
           <p:nvPr/>
         </p:nvPicPr>
@@ -7006,8 +7484,8 @@
         </p:blipFill>
         <p:spPr>
           <a:xfrm>
-            <a:off x="5773024" y="2096325"/>
-            <a:ext cx="2424425" cy="1296900"/>
+            <a:off x="311697" y="3915238"/>
+            <a:ext cx="1535665" cy="821475"/>
           </a:xfrm>
           <a:prstGeom prst="rect">
             <a:avLst/>
@@ -7018,6 +7496,198 @@
           </a:ln>
         </p:spPr>
       </p:pic>
+      <p:sp>
+        <p:nvSpPr>
+          <p:cNvPr id="91" name="Shape 91"/>
+          <p:cNvSpPr/>
+          <p:nvPr/>
+        </p:nvSpPr>
+        <p:spPr>
+          <a:xfrm>
+            <a:off x="2148813" y="2167247"/>
+            <a:ext cx="1560900" cy="1235100"/>
+          </a:xfrm>
+          <a:prstGeom prst="rect">
+            <a:avLst/>
+          </a:prstGeom>
+          <a:solidFill>
+            <a:srgbClr val="1155CC"/>
+          </a:solidFill>
+          <a:ln>
+            <a:noFill/>
+          </a:ln>
+        </p:spPr>
+        <p:txBody>
+          <a:bodyPr anchorCtr="0" anchor="ctr" bIns="91425" lIns="91425" spcFirstLastPara="1" rIns="91425" wrap="square" tIns="91425">
+            <a:noAutofit/>
+          </a:bodyPr>
+          <a:lstStyle/>
+          <a:p>
+            <a:pPr indent="0" lvl="0" marL="0" rtl="0" algn="ctr">
+              <a:spcBef>
+                <a:spcPts val="0"/>
+              </a:spcBef>
+              <a:spcAft>
+                <a:spcPts val="0"/>
+              </a:spcAft>
+              <a:buNone/>
+            </a:pPr>
+            <a:r>
+              <a:rPr lang="nl" sz="1800">
+                <a:solidFill>
+                  <a:schemeClr val="lt1"/>
+                </a:solidFill>
+                <a:latin typeface="Proxima Nova"/>
+                <a:ea typeface="Proxima Nova"/>
+                <a:cs typeface="Proxima Nova"/>
+                <a:sym typeface="Proxima Nova"/>
+              </a:rPr>
+              <a:t>Give label suggestions</a:t>
+            </a:r>
+            <a:endParaRPr sz="1800">
+              <a:solidFill>
+                <a:schemeClr val="lt1"/>
+              </a:solidFill>
+              <a:latin typeface="Proxima Nova"/>
+              <a:ea typeface="Proxima Nova"/>
+              <a:cs typeface="Proxima Nova"/>
+              <a:sym typeface="Proxima Nova"/>
+            </a:endParaRPr>
+          </a:p>
+        </p:txBody>
+      </p:sp>
+      <p:sp>
+        <p:nvSpPr>
+          <p:cNvPr id="92" name="Shape 92"/>
+          <p:cNvSpPr/>
+          <p:nvPr/>
+        </p:nvSpPr>
+        <p:spPr>
+          <a:xfrm>
+            <a:off x="5434282" y="2162900"/>
+            <a:ext cx="1560900" cy="1235100"/>
+          </a:xfrm>
+          <a:prstGeom prst="rect">
+            <a:avLst/>
+          </a:prstGeom>
+          <a:solidFill>
+            <a:srgbClr val="1155CC"/>
+          </a:solidFill>
+          <a:ln cap="flat" cmpd="sng" w="9525">
+            <a:solidFill>
+              <a:srgbClr val="1155CC"/>
+            </a:solidFill>
+            <a:prstDash val="solid"/>
+            <a:round/>
+            <a:headEnd len="sm" w="sm" type="none"/>
+            <a:tailEnd len="sm" w="sm" type="none"/>
+          </a:ln>
+        </p:spPr>
+        <p:txBody>
+          <a:bodyPr anchorCtr="0" anchor="ctr" bIns="91425" lIns="91425" spcFirstLastPara="1" rIns="91425" wrap="square" tIns="91425">
+            <a:noAutofit/>
+          </a:bodyPr>
+          <a:lstStyle/>
+          <a:p>
+            <a:pPr indent="0" lvl="0" marL="0" rtl="0" algn="ctr">
+              <a:spcBef>
+                <a:spcPts val="0"/>
+              </a:spcBef>
+              <a:spcAft>
+                <a:spcPts val="0"/>
+              </a:spcAft>
+              <a:buNone/>
+            </a:pPr>
+            <a:r>
+              <a:rPr lang="nl" sz="1800">
+                <a:solidFill>
+                  <a:schemeClr val="lt1"/>
+                </a:solidFill>
+                <a:latin typeface="Proxima Nova"/>
+                <a:ea typeface="Proxima Nova"/>
+                <a:cs typeface="Proxima Nova"/>
+                <a:sym typeface="Proxima Nova"/>
+              </a:rPr>
+              <a:t>Safe Search</a:t>
+            </a:r>
+            <a:endParaRPr sz="1800">
+              <a:solidFill>
+                <a:schemeClr val="lt1"/>
+              </a:solidFill>
+              <a:latin typeface="Proxima Nova"/>
+              <a:ea typeface="Proxima Nova"/>
+              <a:cs typeface="Proxima Nova"/>
+              <a:sym typeface="Proxima Nova"/>
+            </a:endParaRPr>
+          </a:p>
+        </p:txBody>
+      </p:sp>
+      <p:sp>
+        <p:nvSpPr>
+          <p:cNvPr id="93" name="Shape 93"/>
+          <p:cNvSpPr/>
+          <p:nvPr/>
+        </p:nvSpPr>
+        <p:spPr>
+          <a:xfrm>
+            <a:off x="3791547" y="2167233"/>
+            <a:ext cx="1560900" cy="1235100"/>
+          </a:xfrm>
+          <a:prstGeom prst="rect">
+            <a:avLst/>
+          </a:prstGeom>
+          <a:solidFill>
+            <a:srgbClr val="1155CC"/>
+          </a:solidFill>
+          <a:ln cap="flat" cmpd="sng" w="9525">
+            <a:solidFill>
+              <a:srgbClr val="1155CC"/>
+            </a:solidFill>
+            <a:prstDash val="solid"/>
+            <a:round/>
+            <a:headEnd len="sm" w="sm" type="none"/>
+            <a:tailEnd len="sm" w="sm" type="none"/>
+          </a:ln>
+        </p:spPr>
+        <p:txBody>
+          <a:bodyPr anchorCtr="0" anchor="ctr" bIns="91425" lIns="91425" spcFirstLastPara="1" rIns="91425" wrap="square" tIns="91425">
+            <a:noAutofit/>
+          </a:bodyPr>
+          <a:lstStyle/>
+          <a:p>
+            <a:pPr indent="0" lvl="0" marL="0" rtl="0" algn="ctr">
+              <a:spcBef>
+                <a:spcPts val="0"/>
+              </a:spcBef>
+              <a:spcAft>
+                <a:spcPts val="0"/>
+              </a:spcAft>
+              <a:buNone/>
+            </a:pPr>
+            <a:r>
+              <a:rPr lang="nl" sz="1800">
+                <a:solidFill>
+                  <a:schemeClr val="lt1"/>
+                </a:solidFill>
+                <a:latin typeface="Proxima Nova"/>
+                <a:ea typeface="Proxima Nova"/>
+                <a:cs typeface="Proxima Nova"/>
+                <a:sym typeface="Proxima Nova"/>
+              </a:rPr>
+              <a:t>Give brand suggestions</a:t>
+            </a:r>
+            <a:endParaRPr sz="1800">
+              <a:solidFill>
+                <a:schemeClr val="lt1"/>
+              </a:solidFill>
+              <a:latin typeface="Proxima Nova"/>
+              <a:ea typeface="Proxima Nova"/>
+              <a:cs typeface="Proxima Nova"/>
+              <a:sym typeface="Proxima Nova"/>
+            </a:endParaRPr>
+          </a:p>
+        </p:txBody>
+      </p:sp>
     </p:spTree>
   </p:cSld>
   <p:clrMapOvr>
@@ -7026,12 +7696,12 @@
 </p:sld>
 </file>
 
-<file path=ppt/slides/slide5.xml><?xml version="1.0" encoding="utf-8"?>
+<file path=ppt/slides/slide6.xml><?xml version="1.0" encoding="utf-8"?>
 <p:sld xmlns:a="http://schemas.openxmlformats.org/drawingml/2006/main" xmlns:r="http://schemas.openxmlformats.org/officeDocument/2006/relationships" xmlns:mc="http://schemas.openxmlformats.org/markup-compatibility/2006" xmlns:mv="urn:schemas-microsoft-com:mac:vml" xmlns:p="http://schemas.openxmlformats.org/presentationml/2006/main" xmlns:c="http://schemas.openxmlformats.org/drawingml/2006/chart" xmlns:dgm="http://schemas.openxmlformats.org/drawingml/2006/diagram" xmlns:o="urn:schemas-microsoft-com:office:office" xmlns:v="urn:schemas-microsoft-com:vml" xmlns:pvml="urn:schemas-microsoft-com:office:powerpoint" xmlns:com="http://schemas.openxmlformats.org/drawingml/2006/compatibility" xmlns:p14="http://schemas.microsoft.com/office/powerpoint/2010/main" xmlns:p15="http://schemas.microsoft.com/office/powerpoint/2012/main">
   <p:cSld>
     <p:spTree>
       <p:nvGrpSpPr>
-        <p:cNvPr id="83" name="Shape 83"/>
+        <p:cNvPr id="97" name="Shape 97"/>
         <p:cNvGrpSpPr/>
         <p:nvPr/>
       </p:nvGrpSpPr>
@@ -7045,7 +7715,7 @@
       </p:grpSpPr>
       <p:sp>
         <p:nvSpPr>
-          <p:cNvPr id="84" name="Shape 84"/>
+          <p:cNvPr id="98" name="Shape 98"/>
           <p:cNvSpPr txBox="1"/>
           <p:nvPr>
             <p:ph type="title"/>
@@ -7092,6 +7762,285 @@
 </file>
 
 <file path=ppt/theme/theme1.xml><?xml version="1.0" encoding="utf-8"?>
+<a:theme xmlns:a="http://schemas.openxmlformats.org/drawingml/2006/main" xmlns:r="http://schemas.openxmlformats.org/officeDocument/2006/relationships">
+  <a:themeElements>
+    <a:clrScheme name="Default">
+      <a:dk1>
+        <a:srgbClr val="000000"/>
+      </a:dk1>
+      <a:lt1>
+        <a:srgbClr val="FFFFFF"/>
+      </a:lt1>
+      <a:dk2>
+        <a:srgbClr val="158158"/>
+      </a:dk2>
+      <a:lt2>
+        <a:srgbClr val="F3F3F3"/>
+      </a:lt2>
+      <a:accent1>
+        <a:srgbClr val="058DC7"/>
+      </a:accent1>
+      <a:accent2>
+        <a:srgbClr val="50B432"/>
+      </a:accent2>
+      <a:accent3>
+        <a:srgbClr val="ED561B"/>
+      </a:accent3>
+      <a:accent4>
+        <a:srgbClr val="EDEF00"/>
+      </a:accent4>
+      <a:accent5>
+        <a:srgbClr val="24CBE5"/>
+      </a:accent5>
+      <a:accent6>
+        <a:srgbClr val="64E572"/>
+      </a:accent6>
+      <a:hlink>
+        <a:srgbClr val="2200CC"/>
+      </a:hlink>
+      <a:folHlink>
+        <a:srgbClr val="551A8B"/>
+      </a:folHlink>
+    </a:clrScheme>
+    <a:fontScheme name="Office">
+      <a:majorFont>
+        <a:latin typeface="Arial"/>
+        <a:ea typeface=""/>
+        <a:cs typeface=""/>
+        <a:font script="Jpan" typeface="ＭＳ Ｐゴシック"/>
+        <a:font script="Hang" typeface="맑은 고딕"/>
+        <a:font script="Hans" typeface="宋体"/>
+        <a:font script="Hant" typeface="新細明體"/>
+        <a:font script="Arab" typeface="Times New Roman"/>
+        <a:font script="Hebr" typeface="Times New Roman"/>
+        <a:font script="Thai" typeface="Angsana New"/>
+        <a:font script="Ethi" typeface="Nyala"/>
+        <a:font script="Beng" typeface="Vrinda"/>
+        <a:font script="Gujr" typeface="Shruti"/>
+        <a:font script="Khmr" typeface="MoolBoran"/>
+        <a:font script="Knda" typeface="Tunga"/>
+        <a:font script="Guru" typeface="Raavi"/>
+        <a:font script="Cans" typeface="Euphemia"/>
+        <a:font script="Cher" typeface="Plantagenet Cherokee"/>
+        <a:font script="Yiii" typeface="Microsoft Yi Baiti"/>
+        <a:font script="Tibt" typeface="Microsoft Himalaya"/>
+        <a:font script="Thaa" typeface="MV Boli"/>
+        <a:font script="Deva" typeface="Mangal"/>
+        <a:font script="Telu" typeface="Gautami"/>
+        <a:font script="Taml" typeface="Latha"/>
+        <a:font script="Syrc" typeface="Estrangelo Edessa"/>
+        <a:font script="Orya" typeface="Kalinga"/>
+        <a:font script="Mlym" typeface="Kartika"/>
+        <a:font script="Laoo" typeface="DokChampa"/>
+        <a:font script="Sinh" typeface="Iskoola Pota"/>
+        <a:font script="Mong" typeface="Mongolian Baiti"/>
+        <a:font script="Viet" typeface="Times New Roman"/>
+        <a:font script="Uigh" typeface="Microsoft Uighur"/>
+        <a:font script="Geor" typeface="Sylfaen"/>
+      </a:majorFont>
+      <a:minorFont>
+        <a:latin typeface="Arial"/>
+        <a:ea typeface=""/>
+        <a:cs typeface=""/>
+        <a:font script="Jpan" typeface="ＭＳ Ｐゴシック"/>
+        <a:font script="Hang" typeface="맑은 고딕"/>
+        <a:font script="Hans" typeface="宋体"/>
+        <a:font script="Hant" typeface="新細明體"/>
+        <a:font script="Arab" typeface="Arial"/>
+        <a:font script="Hebr" typeface="Arial"/>
+        <a:font script="Thai" typeface="Cordia New"/>
+        <a:font script="Ethi" typeface="Nyala"/>
+        <a:font script="Beng" typeface="Vrinda"/>
+        <a:font script="Gujr" typeface="Shruti"/>
+        <a:font script="Khmr" typeface="DaunPenh"/>
+        <a:font script="Knda" typeface="Tunga"/>
+        <a:font script="Guru" typeface="Raavi"/>
+        <a:font script="Cans" typeface="Euphemia"/>
+        <a:font script="Cher" typeface="Plantagenet Cherokee"/>
+        <a:font script="Yiii" typeface="Microsoft Yi Baiti"/>
+        <a:font script="Tibt" typeface="Microsoft Himalaya"/>
+        <a:font script="Thaa" typeface="MV Boli"/>
+        <a:font script="Deva" typeface="Mangal"/>
+        <a:font script="Telu" typeface="Gautami"/>
+        <a:font script="Taml" typeface="Latha"/>
+        <a:font script="Syrc" typeface="Estrangelo Edessa"/>
+        <a:font script="Orya" typeface="Kalinga"/>
+        <a:font script="Mlym" typeface="Kartika"/>
+        <a:font script="Laoo" typeface="DokChampa"/>
+        <a:font script="Sinh" typeface="Iskoola Pota"/>
+        <a:font script="Mong" typeface="Mongolian Baiti"/>
+        <a:font script="Viet" typeface="Arial"/>
+        <a:font script="Uigh" typeface="Microsoft Uighur"/>
+        <a:font script="Geor" typeface="Sylfaen"/>
+      </a:minorFont>
+    </a:fontScheme>
+    <a:fmtScheme name="Office">
+      <a:fillStyleLst>
+        <a:solidFill>
+          <a:schemeClr val="phClr"/>
+        </a:solidFill>
+        <a:gradFill rotWithShape="1">
+          <a:gsLst>
+            <a:gs pos="0">
+              <a:schemeClr val="phClr">
+                <a:tint val="50000"/>
+                <a:satMod val="300000"/>
+              </a:schemeClr>
+            </a:gs>
+            <a:gs pos="35000">
+              <a:schemeClr val="phClr">
+                <a:tint val="37000"/>
+                <a:satMod val="300000"/>
+              </a:schemeClr>
+            </a:gs>
+            <a:gs pos="100000">
+              <a:schemeClr val="phClr">
+                <a:tint val="15000"/>
+                <a:satMod val="350000"/>
+              </a:schemeClr>
+            </a:gs>
+          </a:gsLst>
+          <a:lin ang="16200000" scaled="1"/>
+        </a:gradFill>
+        <a:gradFill rotWithShape="1">
+          <a:gsLst>
+            <a:gs pos="0">
+              <a:schemeClr val="phClr">
+                <a:tint val="100000"/>
+                <a:shade val="100000"/>
+                <a:satMod val="130000"/>
+              </a:schemeClr>
+            </a:gs>
+            <a:gs pos="100000">
+              <a:schemeClr val="phClr">
+                <a:tint val="50000"/>
+                <a:shade val="100000"/>
+                <a:satMod val="350000"/>
+              </a:schemeClr>
+            </a:gs>
+          </a:gsLst>
+          <a:lin ang="16200000" scaled="0"/>
+        </a:gradFill>
+      </a:fillStyleLst>
+      <a:lnStyleLst>
+        <a:ln w="9525" cap="flat" cmpd="sng" algn="ctr">
+          <a:solidFill>
+            <a:schemeClr val="phClr">
+              <a:shade val="95000"/>
+              <a:satMod val="105000"/>
+            </a:schemeClr>
+          </a:solidFill>
+          <a:prstDash val="solid"/>
+        </a:ln>
+        <a:ln w="25400" cap="flat" cmpd="sng" algn="ctr">
+          <a:solidFill>
+            <a:schemeClr val="phClr"/>
+          </a:solidFill>
+          <a:prstDash val="solid"/>
+        </a:ln>
+        <a:ln w="38100" cap="flat" cmpd="sng" algn="ctr">
+          <a:solidFill>
+            <a:schemeClr val="phClr"/>
+          </a:solidFill>
+          <a:prstDash val="solid"/>
+        </a:ln>
+      </a:lnStyleLst>
+      <a:effectStyleLst>
+        <a:effectStyle>
+          <a:effectLst>
+            <a:outerShdw blurRad="40000" dist="20000" dir="5400000" rotWithShape="0">
+              <a:srgbClr val="000000">
+                <a:alpha val="38000"/>
+              </a:srgbClr>
+            </a:outerShdw>
+          </a:effectLst>
+        </a:effectStyle>
+        <a:effectStyle>
+          <a:effectLst>
+            <a:outerShdw blurRad="40000" dist="23000" dir="5400000" rotWithShape="0">
+              <a:srgbClr val="000000">
+                <a:alpha val="35000"/>
+              </a:srgbClr>
+            </a:outerShdw>
+          </a:effectLst>
+        </a:effectStyle>
+        <a:effectStyle>
+          <a:effectLst>
+            <a:outerShdw blurRad="40000" dist="23000" dir="5400000" rotWithShape="0">
+              <a:srgbClr val="000000">
+                <a:alpha val="35000"/>
+              </a:srgbClr>
+            </a:outerShdw>
+          </a:effectLst>
+          <a:scene3d>
+            <a:camera prst="orthographicFront">
+              <a:rot lat="0" lon="0" rev="0"/>
+            </a:camera>
+            <a:lightRig rig="threePt" dir="t">
+              <a:rot lat="0" lon="0" rev="1200000"/>
+            </a:lightRig>
+          </a:scene3d>
+          <a:sp3d>
+            <a:bevelT w="63500" h="25400"/>
+          </a:sp3d>
+        </a:effectStyle>
+      </a:effectStyleLst>
+      <a:bgFillStyleLst>
+        <a:solidFill>
+          <a:schemeClr val="phClr"/>
+        </a:solidFill>
+        <a:gradFill rotWithShape="1">
+          <a:gsLst>
+            <a:gs pos="0">
+              <a:schemeClr val="phClr">
+                <a:tint val="40000"/>
+                <a:satMod val="350000"/>
+              </a:schemeClr>
+            </a:gs>
+            <a:gs pos="40000">
+              <a:schemeClr val="phClr">
+                <a:tint val="45000"/>
+                <a:shade val="99000"/>
+                <a:satMod val="350000"/>
+              </a:schemeClr>
+            </a:gs>
+            <a:gs pos="100000">
+              <a:schemeClr val="phClr">
+                <a:shade val="20000"/>
+                <a:satMod val="255000"/>
+              </a:schemeClr>
+            </a:gs>
+          </a:gsLst>
+          <a:path path="circle">
+            <a:fillToRect l="50000" t="-80000" r="50000" b="180000"/>
+          </a:path>
+        </a:gradFill>
+        <a:gradFill rotWithShape="1">
+          <a:gsLst>
+            <a:gs pos="0">
+              <a:schemeClr val="phClr">
+                <a:tint val="80000"/>
+                <a:satMod val="300000"/>
+              </a:schemeClr>
+            </a:gs>
+            <a:gs pos="100000">
+              <a:schemeClr val="phClr">
+                <a:shade val="30000"/>
+                <a:satMod val="200000"/>
+              </a:schemeClr>
+            </a:gs>
+          </a:gsLst>
+          <a:path path="circle">
+            <a:fillToRect l="50000" t="50000" r="50000" b="50000"/>
+          </a:path>
+        </a:gradFill>
+      </a:bgFillStyleLst>
+    </a:fmtScheme>
+  </a:themeElements>
+</a:theme>
+</file>
+
+<file path=ppt/theme/theme2.xml><?xml version="1.0" encoding="utf-8"?>
 <a:theme xmlns:a="http://schemas.openxmlformats.org/drawingml/2006/main" xmlns:r="http://schemas.openxmlformats.org/officeDocument/2006/relationships" name="Gameday">
   <a:themeElements>
     <a:clrScheme name="Gameday">
@@ -7368,283 +8317,4 @@
     </a:fmtScheme>
   </a:themeElements>
 </a:theme>
-</file>
-
-<file path=ppt/theme/theme2.xml><?xml version="1.0" encoding="utf-8"?>
-<a:theme xmlns:a="http://schemas.openxmlformats.org/drawingml/2006/main" xmlns:r="http://schemas.openxmlformats.org/officeDocument/2006/relationships">
-  <a:themeElements>
-    <a:clrScheme name="Default">
-      <a:dk1>
-        <a:srgbClr val="000000"/>
-      </a:dk1>
-      <a:lt1>
-        <a:srgbClr val="FFFFFF"/>
-      </a:lt1>
-      <a:dk2>
-        <a:srgbClr val="158158"/>
-      </a:dk2>
-      <a:lt2>
-        <a:srgbClr val="F3F3F3"/>
-      </a:lt2>
-      <a:accent1>
-        <a:srgbClr val="058DC7"/>
-      </a:accent1>
-      <a:accent2>
-        <a:srgbClr val="50B432"/>
-      </a:accent2>
-      <a:accent3>
-        <a:srgbClr val="ED561B"/>
-      </a:accent3>
-      <a:accent4>
-        <a:srgbClr val="EDEF00"/>
-      </a:accent4>
-      <a:accent5>
-        <a:srgbClr val="24CBE5"/>
-      </a:accent5>
-      <a:accent6>
-        <a:srgbClr val="64E572"/>
-      </a:accent6>
-      <a:hlink>
-        <a:srgbClr val="2200CC"/>
-      </a:hlink>
-      <a:folHlink>
-        <a:srgbClr val="551A8B"/>
-      </a:folHlink>
-    </a:clrScheme>
-    <a:fontScheme name="Office">
-      <a:majorFont>
-        <a:latin typeface="Arial"/>
-        <a:ea typeface=""/>
-        <a:cs typeface=""/>
-        <a:font script="Jpan" typeface="ＭＳ Ｐゴシック"/>
-        <a:font script="Hang" typeface="맑은 고딕"/>
-        <a:font script="Hans" typeface="宋体"/>
-        <a:font script="Hant" typeface="新細明體"/>
-        <a:font script="Arab" typeface="Times New Roman"/>
-        <a:font script="Hebr" typeface="Times New Roman"/>
-        <a:font script="Thai" typeface="Angsana New"/>
-        <a:font script="Ethi" typeface="Nyala"/>
-        <a:font script="Beng" typeface="Vrinda"/>
-        <a:font script="Gujr" typeface="Shruti"/>
-        <a:font script="Khmr" typeface="MoolBoran"/>
-        <a:font script="Knda" typeface="Tunga"/>
-        <a:font script="Guru" typeface="Raavi"/>
-        <a:font script="Cans" typeface="Euphemia"/>
-        <a:font script="Cher" typeface="Plantagenet Cherokee"/>
-        <a:font script="Yiii" typeface="Microsoft Yi Baiti"/>
-        <a:font script="Tibt" typeface="Microsoft Himalaya"/>
-        <a:font script="Thaa" typeface="MV Boli"/>
-        <a:font script="Deva" typeface="Mangal"/>
-        <a:font script="Telu" typeface="Gautami"/>
-        <a:font script="Taml" typeface="Latha"/>
-        <a:font script="Syrc" typeface="Estrangelo Edessa"/>
-        <a:font script="Orya" typeface="Kalinga"/>
-        <a:font script="Mlym" typeface="Kartika"/>
-        <a:font script="Laoo" typeface="DokChampa"/>
-        <a:font script="Sinh" typeface="Iskoola Pota"/>
-        <a:font script="Mong" typeface="Mongolian Baiti"/>
-        <a:font script="Viet" typeface="Times New Roman"/>
-        <a:font script="Uigh" typeface="Microsoft Uighur"/>
-        <a:font script="Geor" typeface="Sylfaen"/>
-      </a:majorFont>
-      <a:minorFont>
-        <a:latin typeface="Arial"/>
-        <a:ea typeface=""/>
-        <a:cs typeface=""/>
-        <a:font script="Jpan" typeface="ＭＳ Ｐゴシック"/>
-        <a:font script="Hang" typeface="맑은 고딕"/>
-        <a:font script="Hans" typeface="宋体"/>
-        <a:font script="Hant" typeface="新細明體"/>
-        <a:font script="Arab" typeface="Arial"/>
-        <a:font script="Hebr" typeface="Arial"/>
-        <a:font script="Thai" typeface="Cordia New"/>
-        <a:font script="Ethi" typeface="Nyala"/>
-        <a:font script="Beng" typeface="Vrinda"/>
-        <a:font script="Gujr" typeface="Shruti"/>
-        <a:font script="Khmr" typeface="DaunPenh"/>
-        <a:font script="Knda" typeface="Tunga"/>
-        <a:font script="Guru" typeface="Raavi"/>
-        <a:font script="Cans" typeface="Euphemia"/>
-        <a:font script="Cher" typeface="Plantagenet Cherokee"/>
-        <a:font script="Yiii" typeface="Microsoft Yi Baiti"/>
-        <a:font script="Tibt" typeface="Microsoft Himalaya"/>
-        <a:font script="Thaa" typeface="MV Boli"/>
-        <a:font script="Deva" typeface="Mangal"/>
-        <a:font script="Telu" typeface="Gautami"/>
-        <a:font script="Taml" typeface="Latha"/>
-        <a:font script="Syrc" typeface="Estrangelo Edessa"/>
-        <a:font script="Orya" typeface="Kalinga"/>
-        <a:font script="Mlym" typeface="Kartika"/>
-        <a:font script="Laoo" typeface="DokChampa"/>
-        <a:font script="Sinh" typeface="Iskoola Pota"/>
-        <a:font script="Mong" typeface="Mongolian Baiti"/>
-        <a:font script="Viet" typeface="Arial"/>
-        <a:font script="Uigh" typeface="Microsoft Uighur"/>
-        <a:font script="Geor" typeface="Sylfaen"/>
-      </a:minorFont>
-    </a:fontScheme>
-    <a:fmtScheme name="Office">
-      <a:fillStyleLst>
-        <a:solidFill>
-          <a:schemeClr val="phClr"/>
-        </a:solidFill>
-        <a:gradFill rotWithShape="1">
-          <a:gsLst>
-            <a:gs pos="0">
-              <a:schemeClr val="phClr">
-                <a:tint val="50000"/>
-                <a:satMod val="300000"/>
-              </a:schemeClr>
-            </a:gs>
-            <a:gs pos="35000">
-              <a:schemeClr val="phClr">
-                <a:tint val="37000"/>
-                <a:satMod val="300000"/>
-              </a:schemeClr>
-            </a:gs>
-            <a:gs pos="100000">
-              <a:schemeClr val="phClr">
-                <a:tint val="15000"/>
-                <a:satMod val="350000"/>
-              </a:schemeClr>
-            </a:gs>
-          </a:gsLst>
-          <a:lin ang="16200000" scaled="1"/>
-        </a:gradFill>
-        <a:gradFill rotWithShape="1">
-          <a:gsLst>
-            <a:gs pos="0">
-              <a:schemeClr val="phClr">
-                <a:tint val="100000"/>
-                <a:shade val="100000"/>
-                <a:satMod val="130000"/>
-              </a:schemeClr>
-            </a:gs>
-            <a:gs pos="100000">
-              <a:schemeClr val="phClr">
-                <a:tint val="50000"/>
-                <a:shade val="100000"/>
-                <a:satMod val="350000"/>
-              </a:schemeClr>
-            </a:gs>
-          </a:gsLst>
-          <a:lin ang="16200000" scaled="0"/>
-        </a:gradFill>
-      </a:fillStyleLst>
-      <a:lnStyleLst>
-        <a:ln w="9525" cap="flat" cmpd="sng" algn="ctr">
-          <a:solidFill>
-            <a:schemeClr val="phClr">
-              <a:shade val="95000"/>
-              <a:satMod val="105000"/>
-            </a:schemeClr>
-          </a:solidFill>
-          <a:prstDash val="solid"/>
-        </a:ln>
-        <a:ln w="25400" cap="flat" cmpd="sng" algn="ctr">
-          <a:solidFill>
-            <a:schemeClr val="phClr"/>
-          </a:solidFill>
-          <a:prstDash val="solid"/>
-        </a:ln>
-        <a:ln w="38100" cap="flat" cmpd="sng" algn="ctr">
-          <a:solidFill>
-            <a:schemeClr val="phClr"/>
-          </a:solidFill>
-          <a:prstDash val="solid"/>
-        </a:ln>
-      </a:lnStyleLst>
-      <a:effectStyleLst>
-        <a:effectStyle>
-          <a:effectLst>
-            <a:outerShdw blurRad="40000" dist="20000" dir="5400000" rotWithShape="0">
-              <a:srgbClr val="000000">
-                <a:alpha val="38000"/>
-              </a:srgbClr>
-            </a:outerShdw>
-          </a:effectLst>
-        </a:effectStyle>
-        <a:effectStyle>
-          <a:effectLst>
-            <a:outerShdw blurRad="40000" dist="23000" dir="5400000" rotWithShape="0">
-              <a:srgbClr val="000000">
-                <a:alpha val="35000"/>
-              </a:srgbClr>
-            </a:outerShdw>
-          </a:effectLst>
-        </a:effectStyle>
-        <a:effectStyle>
-          <a:effectLst>
-            <a:outerShdw blurRad="40000" dist="23000" dir="5400000" rotWithShape="0">
-              <a:srgbClr val="000000">
-                <a:alpha val="35000"/>
-              </a:srgbClr>
-            </a:outerShdw>
-          </a:effectLst>
-          <a:scene3d>
-            <a:camera prst="orthographicFront">
-              <a:rot lat="0" lon="0" rev="0"/>
-            </a:camera>
-            <a:lightRig rig="threePt" dir="t">
-              <a:rot lat="0" lon="0" rev="1200000"/>
-            </a:lightRig>
-          </a:scene3d>
-          <a:sp3d>
-            <a:bevelT w="63500" h="25400"/>
-          </a:sp3d>
-        </a:effectStyle>
-      </a:effectStyleLst>
-      <a:bgFillStyleLst>
-        <a:solidFill>
-          <a:schemeClr val="phClr"/>
-        </a:solidFill>
-        <a:gradFill rotWithShape="1">
-          <a:gsLst>
-            <a:gs pos="0">
-              <a:schemeClr val="phClr">
-                <a:tint val="40000"/>
-                <a:satMod val="350000"/>
-              </a:schemeClr>
-            </a:gs>
-            <a:gs pos="40000">
-              <a:schemeClr val="phClr">
-                <a:tint val="45000"/>
-                <a:shade val="99000"/>
-                <a:satMod val="350000"/>
-              </a:schemeClr>
-            </a:gs>
-            <a:gs pos="100000">
-              <a:schemeClr val="phClr">
-                <a:shade val="20000"/>
-                <a:satMod val="255000"/>
-              </a:schemeClr>
-            </a:gs>
-          </a:gsLst>
-          <a:path path="circle">
-            <a:fillToRect l="50000" t="-80000" r="50000" b="180000"/>
-          </a:path>
-        </a:gradFill>
-        <a:gradFill rotWithShape="1">
-          <a:gsLst>
-            <a:gs pos="0">
-              <a:schemeClr val="phClr">
-                <a:tint val="80000"/>
-                <a:satMod val="300000"/>
-              </a:schemeClr>
-            </a:gs>
-            <a:gs pos="100000">
-              <a:schemeClr val="phClr">
-                <a:shade val="30000"/>
-                <a:satMod val="200000"/>
-              </a:schemeClr>
-            </a:gs>
-          </a:gsLst>
-          <a:path path="circle">
-            <a:fillToRect l="50000" t="50000" r="50000" b="50000"/>
-          </a:path>
-        </a:gradFill>
-      </a:bgFillStyleLst>
-    </a:fmtScheme>
-  </a:themeElements>
-</a:theme>
 </file>
</xml_diff>